<commit_message>
added more basic entities and visitors
</commit_message>
<xml_diff>
--- a/presentation/2 (15.12.).pptx
+++ b/presentation/2 (15.12.).pptx
@@ -5,7 +5,7 @@
     <p:sldMasterId id="2147483690" r:id="rId1"/>
   </p:sldMasterIdLst>
   <p:notesMasterIdLst>
-    <p:notesMasterId r:id="rId8"/>
+    <p:notesMasterId r:id="rId9"/>
   </p:notesMasterIdLst>
   <p:sldIdLst>
     <p:sldId id="256" r:id="rId2"/>
@@ -13,7 +13,8 @@
     <p:sldId id="257" r:id="rId4"/>
     <p:sldId id="267" r:id="rId5"/>
     <p:sldId id="268" r:id="rId6"/>
-    <p:sldId id="266" r:id="rId7"/>
+    <p:sldId id="269" r:id="rId7"/>
+    <p:sldId id="266" r:id="rId8"/>
   </p:sldIdLst>
   <p:sldSz cx="12192000" cy="6858000"/>
   <p:notesSz cx="6858000" cy="9144000"/>
@@ -213,7 +214,7 @@
           <a:p>
             <a:fld id="{4BAE1832-F954-4CA9-8211-72A0AC693DE2}" type="datetimeFigureOut">
               <a:rPr lang="cs-CZ" smtClean="0"/>
-              <a:t>15.12.2019</a:t>
+              <a:t>16.12.2019</a:t>
             </a:fld>
             <a:endParaRPr lang="cs-CZ"/>
           </a:p>
@@ -545,7 +546,7 @@
           <a:p>
             <a:fld id="{5E85CD49-5AE1-46F7-B883-C80844C77677}" type="slidenum">
               <a:rPr lang="cs-CZ" smtClean="0"/>
-              <a:t>6</a:t>
+              <a:t>7</a:t>
             </a:fld>
             <a:endParaRPr lang="cs-CZ"/>
           </a:p>
@@ -4466,7 +4467,7 @@
             </a:fld>
             <a:r>
               <a:rPr lang="cs-CZ" sz="1200" dirty="0"/>
-              <a:t> / 6</a:t>
+              <a:t> / 7</a:t>
             </a:r>
           </a:p>
         </p:txBody>
@@ -4826,7 +4827,7 @@
             </a:fld>
             <a:r>
               <a:rPr lang="cs-CZ" sz="1200" dirty="0"/>
-              <a:t> / 6</a:t>
+              <a:t> / 7</a:t>
             </a:r>
           </a:p>
         </p:txBody>
@@ -4904,7 +4905,7 @@
             </a:fld>
             <a:r>
               <a:rPr lang="cs-CZ" sz="1200" dirty="0"/>
-              <a:t> / 6</a:t>
+              <a:t> / 7</a:t>
             </a:r>
           </a:p>
         </p:txBody>
@@ -5123,7 +5124,7 @@
             </a:fld>
             <a:r>
               <a:rPr lang="cs-CZ" sz="1200" dirty="0"/>
-              <a:t> / 6</a:t>
+              <a:t> / 7</a:t>
             </a:r>
           </a:p>
         </p:txBody>
@@ -5258,6 +5259,136 @@
       </p:grpSpPr>
       <p:sp>
         <p:nvSpPr>
+          <p:cNvPr id="2" name="Nadpis 1">
+            <a:extLst>
+              <a:ext uri="{FF2B5EF4-FFF2-40B4-BE49-F238E27FC236}">
+                <a16:creationId xmlns:a16="http://schemas.microsoft.com/office/drawing/2014/main" id="{15D9BEF9-EAC3-43DB-B458-0B1BE12FAD6D}"/>
+              </a:ext>
+            </a:extLst>
+          </p:cNvPr>
+          <p:cNvSpPr>
+            <a:spLocks noGrp="1"/>
+          </p:cNvSpPr>
+          <p:nvPr>
+            <p:ph type="title"/>
+          </p:nvPr>
+        </p:nvSpPr>
+        <p:spPr/>
+        <p:txBody>
+          <a:bodyPr/>
+          <a:lstStyle/>
+          <a:p>
+            <a:r>
+              <a:rPr lang="cs-CZ" dirty="0"/>
+              <a:t>Odkaz na úložiště</a:t>
+            </a:r>
+          </a:p>
+        </p:txBody>
+      </p:sp>
+      <p:sp>
+        <p:nvSpPr>
+          <p:cNvPr id="4" name="Zástupný symbol pro číslo snímku 3">
+            <a:extLst>
+              <a:ext uri="{FF2B5EF4-FFF2-40B4-BE49-F238E27FC236}">
+                <a16:creationId xmlns:a16="http://schemas.microsoft.com/office/drawing/2014/main" id="{C55CB989-A543-4F52-8608-FC0E4FF9BFD2}"/>
+              </a:ext>
+            </a:extLst>
+          </p:cNvPr>
+          <p:cNvSpPr>
+            <a:spLocks noGrp="1"/>
+          </p:cNvSpPr>
+          <p:nvPr>
+            <p:ph type="sldNum" sz="quarter" idx="12"/>
+          </p:nvPr>
+        </p:nvSpPr>
+        <p:spPr/>
+        <p:txBody>
+          <a:bodyPr/>
+          <a:lstStyle/>
+          <a:p>
+            <a:fld id="{D8B01677-E260-4E98-B77E-BB7A87F37343}" type="slidenum">
+              <a:rPr lang="cs-CZ" smtClean="0"/>
+              <a:t>6</a:t>
+            </a:fld>
+            <a:r>
+              <a:rPr lang="cs-CZ" dirty="0"/>
+              <a:t>  /  7</a:t>
+            </a:r>
+          </a:p>
+        </p:txBody>
+      </p:sp>
+      <p:sp>
+        <p:nvSpPr>
+          <p:cNvPr id="10" name="Zástupný symbol pro obsah 2">
+            <a:extLst>
+              <a:ext uri="{FF2B5EF4-FFF2-40B4-BE49-F238E27FC236}">
+                <a16:creationId xmlns:a16="http://schemas.microsoft.com/office/drawing/2014/main" id="{B628DBD0-9758-40FA-93B8-2AA395008A75}"/>
+              </a:ext>
+            </a:extLst>
+          </p:cNvPr>
+          <p:cNvSpPr>
+            <a:spLocks noGrp="1"/>
+          </p:cNvSpPr>
+          <p:nvPr>
+            <p:ph idx="1"/>
+          </p:nvPr>
+        </p:nvSpPr>
+        <p:spPr>
+          <a:xfrm>
+            <a:off x="1117600" y="1825625"/>
+            <a:ext cx="10236200" cy="4351338"/>
+          </a:xfrm>
+        </p:spPr>
+        <p:txBody>
+          <a:bodyPr>
+            <a:noAutofit/>
+          </a:bodyPr>
+          <a:lstStyle/>
+          <a:p>
+            <a:pPr marL="358775" indent="-266700">
+              <a:buFont typeface="Arial" panose="020B0604020202020204" pitchFamily="34" charset="0"/>
+              <a:buChar char="•"/>
+            </a:pPr>
+            <a:r>
+              <a:rPr lang="cs-CZ" dirty="0"/>
+              <a:t>https://github.com/JitkaP/FJP-project</a:t>
+            </a:r>
+            <a:endParaRPr lang="cs-CZ" sz="2000" dirty="0"/>
+          </a:p>
+        </p:txBody>
+      </p:sp>
+    </p:spTree>
+    <p:extLst>
+      <p:ext uri="{BB962C8B-B14F-4D97-AF65-F5344CB8AC3E}">
+        <p14:creationId xmlns:p14="http://schemas.microsoft.com/office/powerpoint/2010/main" val="3936680336"/>
+      </p:ext>
+    </p:extLst>
+  </p:cSld>
+  <p:clrMapOvr>
+    <a:masterClrMapping/>
+  </p:clrMapOvr>
+</p:sld>
+</file>
+
+<file path=ppt/slides/slide7.xml><?xml version="1.0" encoding="utf-8"?>
+<p:sld xmlns:a="http://schemas.openxmlformats.org/drawingml/2006/main" xmlns:r="http://schemas.openxmlformats.org/officeDocument/2006/relationships" xmlns:p="http://schemas.openxmlformats.org/presentationml/2006/main">
+  <p:cSld>
+    <p:spTree>
+      <p:nvGrpSpPr>
+        <p:cNvPr id="1" name=""/>
+        <p:cNvGrpSpPr/>
+        <p:nvPr/>
+      </p:nvGrpSpPr>
+      <p:grpSpPr>
+        <a:xfrm>
+          <a:off x="0" y="0"/>
+          <a:ext cx="0" cy="0"/>
+          <a:chOff x="0" y="0"/>
+          <a:chExt cx="0" cy="0"/>
+        </a:xfrm>
+      </p:grpSpPr>
+      <p:sp>
+        <p:nvSpPr>
           <p:cNvPr id="2" name="Nadpis 1"/>
           <p:cNvSpPr>
             <a:spLocks noGrp="1"/>
@@ -5326,7 +5457,7 @@
           <a:p>
             <a:r>
               <a:rPr lang="cs-CZ" sz="1200" dirty="0"/>
-              <a:t>6 / 6</a:t>
+              <a:t>7 / 7</a:t>
             </a:r>
           </a:p>
         </p:txBody>

</xml_diff>